<commit_message>
Updated title slides and notebooks headers. Task comeplete.
</commit_message>
<xml_diff>
--- a/lectures/week10/lecture1/slides/week10_lecture1.pptx
+++ b/lectures/week10/lecture1/slides/week10_lecture1.pptx
@@ -308,7 +308,7 @@
           <a:p>
             <a:fld id="{2C1D2CCD-74E5-4836-9AA3-73B35EB7134E}" type="datetimeFigureOut">
               <a:rPr lang="en-CA" smtClean="0"/>
-              <a:t>2025-03-18</a:t>
+              <a:t>2025-12-18</a:t>
             </a:fld>
             <a:endParaRPr lang="en-CA"/>
           </a:p>
@@ -2492,7 +2492,7 @@
                   <a:schemeClr val="accent6"/>
                 </a:solidFill>
               </a:rPr>
-              <a:t>2 </a:t>
+              <a:t>1 </a:t>
             </a:r>
             <a:r>
               <a:rPr lang="en-US" dirty="0">
@@ -2520,7 +2520,7 @@
                   <a:schemeClr val="accent6"/>
                 </a:solidFill>
               </a:rPr>
-              <a:t>2</a:t>
+              <a:t>1</a:t>
             </a:r>
             <a:r>
               <a:rPr lang="en-US" dirty="0">
@@ -36364,11 +36364,11 @@
           <a:lstStyle/>
           <a:p>
             <a:r>
-              <a:rPr lang="en-US" b="1"/>
+              <a:rPr lang="en-US" b="1" dirty="0"/>
               <a:t>Week </a:t>
             </a:r>
             <a:r>
-              <a:rPr lang="en-US" b="1">
+              <a:rPr lang="en-US" b="1" dirty="0">
                 <a:solidFill>
                   <a:schemeClr val="accent6"/>
                 </a:solidFill>
@@ -36376,7 +36376,7 @@
               <a:t>10</a:t>
             </a:r>
             <a:r>
-              <a:rPr lang="en-US" b="1"/>
+              <a:rPr lang="en-US" b="1" dirty="0"/>
               <a:t> </a:t>
             </a:r>
             <a:r>
@@ -36392,15 +36392,15 @@
               <a:t> Lecture </a:t>
             </a:r>
             <a:r>
-              <a:rPr lang="en-US">
+              <a:rPr lang="en-US" dirty="0">
                 <a:solidFill>
                   <a:schemeClr val="accent6"/>
                 </a:solidFill>
               </a:rPr>
-              <a:t>2 </a:t>
-            </a:r>
-            <a:r>
-              <a:rPr lang="en-US">
+              <a:t>1 </a:t>
+            </a:r>
+            <a:r>
+              <a:rPr lang="en-US" dirty="0">
                 <a:solidFill>
                   <a:schemeClr val="accent1"/>
                 </a:solidFill>
@@ -36408,32 +36408,24 @@
               <a:t>(</a:t>
             </a:r>
             <a:r>
-              <a:rPr lang="en-US">
+              <a:rPr lang="en-US" dirty="0">
                 <a:solidFill>
                   <a:schemeClr val="accent6"/>
                 </a:solidFill>
               </a:rPr>
+              <a:t>10</a:t>
+            </a:r>
+            <a:r>
+              <a:rPr lang="en-US" dirty="0"/>
+              <a:t>.</a:t>
+            </a:r>
+            <a:r>
+              <a:rPr lang="en-US" dirty="0">
+                <a:solidFill>
+                  <a:schemeClr val="accent6"/>
+                </a:solidFill>
+              </a:rPr>
               <a:t>1</a:t>
-            </a:r>
-            <a:r>
-              <a:rPr lang="en-US" dirty="0">
-                <a:solidFill>
-                  <a:schemeClr val="accent6"/>
-                </a:solidFill>
-              </a:rPr>
-              <a:t>0</a:t>
-            </a:r>
-            <a:r>
-              <a:rPr lang="en-US"/>
-              <a:t>.</a:t>
-            </a:r>
-            <a:r>
-              <a:rPr lang="en-US">
-                <a:solidFill>
-                  <a:schemeClr val="accent6"/>
-                </a:solidFill>
-              </a:rPr>
-              <a:t>2</a:t>
             </a:r>
             <a:r>
               <a:rPr lang="en-US" dirty="0">

</xml_diff>